<commit_message>
4Developers 2023 - presentation update
</commit_message>
<xml_diff>
--- a/4Developers 2023.pptx
+++ b/4Developers 2023.pptx
@@ -255,7 +255,7 @@
       <p15:sldGuideLst xmlns:p15="http://schemas.microsoft.com/office/powerpoint/2012/main"/>
     </p:ext>
     <p:ext uri="http://customooxmlschemas.google.com/">
-      <go:slidesCustomData xmlns="" xmlns:mc="http://schemas.openxmlformats.org/markup-compatibility/2006" xmlns:mv="urn:schemas-microsoft-com:mac:vml" xmlns:c="http://schemas.openxmlformats.org/drawingml/2006/chart" xmlns:dgm="http://schemas.openxmlformats.org/drawingml/2006/diagram" xmlns:o="urn:schemas-microsoft-com:office:office" xmlns:v="urn:schemas-microsoft-com:vml" xmlns:pvml="urn:schemas-microsoft-com:office:powerpoint" xmlns:com="http://schemas.openxmlformats.org/drawingml/2006/compatibility" xmlns:p14="http://schemas.microsoft.com/office/powerpoint/2010/main" xmlns:p15="http://schemas.microsoft.com/office/powerpoint/2012/main" xmlns:ahyp="http://schemas.microsoft.com/office/drawing/2018/hyperlinkcolor" xmlns:go="http://customooxmlschemas.google.com/" r:id="rId24" roundtripDataSignature="AMtx7mhl7MBRvAVRHwFm7WNgn9mIwQSn+w=="/>
+      <go:slidesCustomData xmlns:go="http://customooxmlschemas.google.com/" xmlns:ahyp="http://schemas.microsoft.com/office/drawing/2018/hyperlinkcolor" xmlns:p15="http://schemas.microsoft.com/office/powerpoint/2012/main" xmlns:p14="http://schemas.microsoft.com/office/powerpoint/2010/main" xmlns:com="http://schemas.openxmlformats.org/drawingml/2006/compatibility" xmlns:pvml="urn:schemas-microsoft-com:office:powerpoint" xmlns:v="urn:schemas-microsoft-com:vml" xmlns:o="urn:schemas-microsoft-com:office:office" xmlns:dgm="http://schemas.openxmlformats.org/drawingml/2006/diagram" xmlns:c="http://schemas.openxmlformats.org/drawingml/2006/chart" xmlns:mv="urn:schemas-microsoft-com:mac:vml" xmlns:mc="http://schemas.openxmlformats.org/markup-compatibility/2006" xmlns="" r:id="rId24" roundtripDataSignature="AMtx7mhl7MBRvAVRHwFm7WNgn9mIwQSn+w=="/>
     </p:ext>
   </p:extLst>
 </p:presentation>
@@ -45472,8 +45472,8 @@
         </p:nvSpPr>
         <p:spPr>
           <a:xfrm>
-            <a:off x="804409" y="6303773"/>
-            <a:ext cx="5669280" cy="1773427"/>
+            <a:off x="804409" y="6178008"/>
+            <a:ext cx="6371910" cy="1773427"/>
           </a:xfrm>
           <a:prstGeom prst="rect">
             <a:avLst/>
@@ -45485,13 +45485,13 @@
         </p:spPr>
         <p:txBody>
           <a:bodyPr spcFirstLastPara="1" wrap="square" lIns="91425" tIns="45700" rIns="91425" bIns="45700" anchor="t" anchorCtr="0">
-            <a:normAutofit/>
+            <a:noAutofit/>
           </a:bodyPr>
           <a:lstStyle/>
           <a:p>
             <a:pPr algn="l"/>
             <a:r>
-              <a:rPr lang="pl-PL" sz="3600" b="1" i="0" dirty="0">
+              <a:rPr lang="pl-PL" sz="4000" b="1" i="0" dirty="0">
                 <a:solidFill>
                   <a:srgbClr val="FFFFFF"/>
                 </a:solidFill>
@@ -45501,7 +45501,7 @@
               <a:t>REST API na resorach – </a:t>
             </a:r>
             <a:br>
-              <a:rPr lang="pl-PL" sz="3600" b="1" i="0" dirty="0">
+              <a:rPr lang="pl-PL" sz="4000" b="1" i="0" dirty="0">
                 <a:solidFill>
                   <a:srgbClr val="FFFFFF"/>
                 </a:solidFill>
@@ -45510,7 +45510,7 @@
               </a:rPr>
             </a:br>
             <a:r>
-              <a:rPr lang="pl-PL" sz="3600" b="1" i="0" dirty="0">
+              <a:rPr lang="pl-PL" sz="4000" b="1" i="0" dirty="0">
                 <a:solidFill>
                   <a:srgbClr val="FFFFFF"/>
                 </a:solidFill>
@@ -45520,7 +45520,7 @@
               <a:t>czyli jak przeprowadzić </a:t>
             </a:r>
             <a:r>
-              <a:rPr lang="pl-PL" sz="3600" b="1" i="0" dirty="0" err="1">
+              <a:rPr lang="pl-PL" sz="4000" b="1" i="0" dirty="0" err="1">
                 <a:solidFill>
                   <a:srgbClr val="FFFFFF"/>
                 </a:solidFill>
@@ -45530,7 +45530,7 @@
               <a:t>tuning</a:t>
             </a:r>
             <a:r>
-              <a:rPr lang="pl-PL" sz="3600" b="1" i="0" dirty="0">
+              <a:rPr lang="pl-PL" sz="4000" b="1" i="0" dirty="0">
                 <a:solidFill>
                   <a:srgbClr val="FFFFFF"/>
                 </a:solidFill>
@@ -47589,7 +47589,7 @@
                   <a:schemeClr val="tx1"/>
                 </a:solidFill>
               </a:rPr>
-              <a:t> na obciążonych </a:t>
+              <a:t> w jednostce czasu na obciążonych </a:t>
             </a:r>
             <a:r>
               <a:rPr lang="pl-PL" sz="3200" dirty="0" err="1">
@@ -48611,7 +48611,7 @@
             </a:r>
             <a:r>
               <a:rPr lang="pl-PL" sz="3200" b="1" dirty="0"/>
-              <a:t> usług REST</a:t>
+              <a:t> usług</a:t>
             </a:r>
           </a:p>
           <a:p>

</xml_diff>